<commit_message>
KAN 04 neue Lizenzen eingepflegt
</commit_message>
<xml_diff>
--- a/training-cards/music moves/Kanban (KAN)/ger_KAN_04_Geschafft_MM_A.pptx
+++ b/training-cards/music moves/Kanban (KAN)/ger_KAN_04_Geschafft_MM_A.pptx
@@ -212,7 +212,7 @@
           <a:p>
             <a:fld id="{10F8DC5B-5F6F-B341-A0E1-3C37FC6B86DA}" type="datetimeFigureOut">
               <a:rPr lang="de-DE" smtClean="0"/>
-              <a:t>01.09.18</a:t>
+              <a:t>23.07.23</a:t>
             </a:fld>
             <a:endParaRPr lang="de-DE"/>
           </a:p>
@@ -683,14 +683,20 @@
       </p:pic>
       <p:sp>
         <p:nvSpPr>
-          <p:cNvPr id="5" name="Shape 7"/>
+          <p:cNvPr id="4" name="Shape 7">
+            <a:extLst>
+              <a:ext uri="{FF2B5EF4-FFF2-40B4-BE49-F238E27FC236}">
+                <a16:creationId xmlns:a16="http://schemas.microsoft.com/office/drawing/2014/main" id="{32767C57-836F-2C86-FC07-4B6B4ECE85D8}"/>
+              </a:ext>
+            </a:extLst>
+          </p:cNvPr>
           <p:cNvSpPr/>
           <p:nvPr userDrawn="1"/>
         </p:nvSpPr>
         <p:spPr>
           <a:xfrm>
-            <a:off x="1683417" y="4952581"/>
-            <a:ext cx="4196016" cy="276995"/>
+            <a:off x="971550" y="4689585"/>
+            <a:ext cx="4691860" cy="461661"/>
           </a:xfrm>
           <a:prstGeom prst="rect">
             <a:avLst/>
@@ -700,12 +706,12 @@
           </a:ln>
           <a:extLst>
             <a:ext uri="{C572A759-6A51-4108-AA02-DFA0A04FC94B}">
-              <ma14:wrappingTextBoxFlag xmlns:ma14="http://schemas.microsoft.com/office/mac/drawingml/2011/main" xmlns="" val="1"/>
+              <ma14:wrappingTextBoxFlag xmlns="" xmlns:ma14="http://schemas.microsoft.com/office/mac/drawingml/2011/main" val="1"/>
             </a:ext>
           </a:extLst>
         </p:spPr>
         <p:txBody>
-          <a:bodyPr wrap="none" lIns="45718" tIns="45718" rIns="45718" bIns="45718">
+          <a:bodyPr wrap="square" lIns="45718" tIns="45718" rIns="45718" bIns="45718">
             <a:spAutoFit/>
           </a:bodyPr>
           <a:lstStyle/>
@@ -714,49 +720,266 @@
               <a:defRPr sz="1800"/>
             </a:pPr>
             <a:r>
-              <a:rPr sz="600" dirty="0">
-                <a:latin typeface="Avenir Light"/>
+              <a:rPr lang="de-DE" sz="800" b="0" i="0" u="none" strike="noStrike" dirty="0" err="1">
+                <a:solidFill>
+                  <a:schemeClr val="tx1">
+                    <a:lumMod val="65000"/>
+                    <a:lumOff val="35000"/>
+                  </a:schemeClr>
+                </a:solidFill>
+                <a:effectLst/>
+                <a:latin typeface="Avenir Book" panose="02000503020000020003" pitchFamily="2" charset="0"/>
+              </a:rPr>
+              <a:t>music</a:t>
+            </a:r>
+            <a:r>
+              <a:rPr lang="de-DE" sz="800" b="0" i="0" u="none" strike="noStrike" dirty="0">
+                <a:solidFill>
+                  <a:schemeClr val="tx1">
+                    <a:lumMod val="65000"/>
+                    <a:lumOff val="35000"/>
+                  </a:schemeClr>
+                </a:solidFill>
+                <a:effectLst/>
+                <a:latin typeface="Avenir Book" panose="02000503020000020003" pitchFamily="2" charset="0"/>
+              </a:rPr>
+              <a:t> </a:t>
+            </a:r>
+            <a:r>
+              <a:rPr lang="de-DE" sz="800" b="0" i="0" u="none" strike="noStrike" dirty="0" err="1">
+                <a:solidFill>
+                  <a:schemeClr val="tx1">
+                    <a:lumMod val="65000"/>
+                    <a:lumOff val="35000"/>
+                  </a:schemeClr>
+                </a:solidFill>
+                <a:effectLst/>
+                <a:latin typeface="Avenir Book" panose="02000503020000020003" pitchFamily="2" charset="0"/>
+              </a:rPr>
+              <a:t>moves</a:t>
+            </a:r>
+            <a:r>
+              <a:rPr lang="de-DE" sz="800" b="0" i="0" u="none" strike="noStrike" dirty="0">
+                <a:solidFill>
+                  <a:schemeClr val="tx1">
+                    <a:lumMod val="65000"/>
+                    <a:lumOff val="35000"/>
+                  </a:schemeClr>
+                </a:solidFill>
+                <a:effectLst/>
+                <a:latin typeface="Avenir Book" panose="02000503020000020003" pitchFamily="2" charset="0"/>
+              </a:rPr>
+              <a:t>-Trainingskarten von Regina Brandhuber sind lizenziert unter einer Creative Commons </a:t>
+            </a:r>
+          </a:p>
+          <a:p>
+            <a:pPr lvl="0" algn="ctr">
+              <a:defRPr sz="1800"/>
+            </a:pPr>
+            <a:r>
+              <a:rPr lang="de-DE" sz="800" b="0" i="0" u="none" strike="noStrike" dirty="0">
+                <a:solidFill>
+                  <a:schemeClr val="tx1">
+                    <a:lumMod val="65000"/>
+                    <a:lumOff val="35000"/>
+                  </a:schemeClr>
+                </a:solidFill>
+                <a:effectLst/>
+                <a:latin typeface="Avenir Book" panose="02000503020000020003" pitchFamily="2" charset="0"/>
+              </a:rPr>
+              <a:t>Namensnennung-Nicht kommerziell 4.0 International Lizenz.</a:t>
+            </a:r>
+          </a:p>
+          <a:p>
+            <a:pPr lvl="0" algn="ctr">
+              <a:defRPr sz="1800"/>
+            </a:pPr>
+            <a:r>
+              <a:rPr lang="de-DE" sz="800" dirty="0">
+                <a:solidFill>
+                  <a:schemeClr val="tx1">
+                    <a:lumMod val="65000"/>
+                    <a:lumOff val="35000"/>
+                  </a:schemeClr>
+                </a:solidFill>
+                <a:latin typeface="Avenir Book" panose="02000503020000020003" pitchFamily="2" charset="0"/>
                 <a:ea typeface="Calibri"/>
                 <a:cs typeface="Avenir Light"/>
                 <a:sym typeface="Calibri"/>
               </a:rPr>
-              <a:t>This work is licensed under the Creative Commons Attribution-NonCommercial-NoDerivatives 4.0 International License. </a:t>
-            </a:r>
-          </a:p>
-          <a:p>
-            <a:pPr lvl="0" algn="ctr">
-              <a:defRPr sz="1800"/>
-            </a:pPr>
-            <a:r>
-              <a:rPr sz="600" dirty="0">
-                <a:latin typeface="Avenir Light"/>
+              <a:t>Nachzulesen unter:</a:t>
+            </a:r>
+            <a:r>
+              <a:rPr sz="800" dirty="0">
+                <a:solidFill>
+                  <a:schemeClr val="tx1">
+                    <a:lumMod val="65000"/>
+                    <a:lumOff val="35000"/>
+                  </a:schemeClr>
+                </a:solidFill>
+                <a:latin typeface="Avenir Book" panose="02000503020000020003" pitchFamily="2" charset="0"/>
                 <a:ea typeface="Calibri"/>
                 <a:cs typeface="Avenir Light"/>
                 <a:sym typeface="Calibri"/>
               </a:rPr>
-              <a:t>To view a copy of this license, visit http://creativecommons.org/licenses/by-nc-nd/4.0/.</a:t>
-            </a:r>
+              <a:t> </a:t>
+            </a:r>
+            <a:r>
+              <a:rPr lang="de-DE" sz="800" dirty="0">
+                <a:solidFill>
+                  <a:schemeClr val="tx1">
+                    <a:lumMod val="65000"/>
+                    <a:lumOff val="35000"/>
+                  </a:schemeClr>
+                </a:solidFill>
+                <a:latin typeface="Avenir Book" panose="02000503020000020003" pitchFamily="2" charset="0"/>
+                <a:ea typeface="Calibri"/>
+                <a:cs typeface="Avenir Light"/>
+                <a:sym typeface="Calibri"/>
+              </a:rPr>
+              <a:t>https://</a:t>
+            </a:r>
+            <a:r>
+              <a:rPr lang="de-DE" sz="800" dirty="0" err="1">
+                <a:solidFill>
+                  <a:schemeClr val="tx1">
+                    <a:lumMod val="65000"/>
+                    <a:lumOff val="35000"/>
+                  </a:schemeClr>
+                </a:solidFill>
+                <a:latin typeface="Avenir Book" panose="02000503020000020003" pitchFamily="2" charset="0"/>
+                <a:ea typeface="Calibri"/>
+                <a:cs typeface="Avenir Light"/>
+                <a:sym typeface="Calibri"/>
+              </a:rPr>
+              <a:t>creativecommons.org</a:t>
+            </a:r>
+            <a:r>
+              <a:rPr lang="de-DE" sz="800" dirty="0">
+                <a:solidFill>
+                  <a:schemeClr val="tx1">
+                    <a:lumMod val="65000"/>
+                    <a:lumOff val="35000"/>
+                  </a:schemeClr>
+                </a:solidFill>
+                <a:latin typeface="Avenir Book" panose="02000503020000020003" pitchFamily="2" charset="0"/>
+                <a:ea typeface="Calibri"/>
+                <a:cs typeface="Avenir Light"/>
+                <a:sym typeface="Calibri"/>
+              </a:rPr>
+              <a:t>/</a:t>
+            </a:r>
+            <a:r>
+              <a:rPr lang="de-DE" sz="800" dirty="0" err="1">
+                <a:solidFill>
+                  <a:schemeClr val="tx1">
+                    <a:lumMod val="65000"/>
+                    <a:lumOff val="35000"/>
+                  </a:schemeClr>
+                </a:solidFill>
+                <a:latin typeface="Avenir Book" panose="02000503020000020003" pitchFamily="2" charset="0"/>
+                <a:ea typeface="Calibri"/>
+                <a:cs typeface="Avenir Light"/>
+                <a:sym typeface="Calibri"/>
+              </a:rPr>
+              <a:t>licenses</a:t>
+            </a:r>
+            <a:r>
+              <a:rPr lang="de-DE" sz="800" dirty="0">
+                <a:solidFill>
+                  <a:schemeClr val="tx1">
+                    <a:lumMod val="65000"/>
+                    <a:lumOff val="35000"/>
+                  </a:schemeClr>
+                </a:solidFill>
+                <a:latin typeface="Avenir Book" panose="02000503020000020003" pitchFamily="2" charset="0"/>
+                <a:ea typeface="Calibri"/>
+                <a:cs typeface="Avenir Light"/>
+                <a:sym typeface="Calibri"/>
+              </a:rPr>
+              <a:t>/</a:t>
+            </a:r>
+            <a:r>
+              <a:rPr lang="de-DE" sz="800" dirty="0" err="1">
+                <a:solidFill>
+                  <a:schemeClr val="tx1">
+                    <a:lumMod val="65000"/>
+                    <a:lumOff val="35000"/>
+                  </a:schemeClr>
+                </a:solidFill>
+                <a:latin typeface="Avenir Book" panose="02000503020000020003" pitchFamily="2" charset="0"/>
+                <a:ea typeface="Calibri"/>
+                <a:cs typeface="Avenir Light"/>
+                <a:sym typeface="Calibri"/>
+              </a:rPr>
+              <a:t>by-nc</a:t>
+            </a:r>
+            <a:r>
+              <a:rPr lang="de-DE" sz="800" dirty="0">
+                <a:solidFill>
+                  <a:schemeClr val="tx1">
+                    <a:lumMod val="65000"/>
+                    <a:lumOff val="35000"/>
+                  </a:schemeClr>
+                </a:solidFill>
+                <a:latin typeface="Avenir Book" panose="02000503020000020003" pitchFamily="2" charset="0"/>
+                <a:ea typeface="Calibri"/>
+                <a:cs typeface="Avenir Light"/>
+                <a:sym typeface="Calibri"/>
+              </a:rPr>
+              <a:t>/4.0/</a:t>
+            </a:r>
+            <a:r>
+              <a:rPr lang="de-DE" sz="800" dirty="0" err="1">
+                <a:solidFill>
+                  <a:schemeClr val="tx1">
+                    <a:lumMod val="65000"/>
+                    <a:lumOff val="35000"/>
+                  </a:schemeClr>
+                </a:solidFill>
+                <a:latin typeface="Avenir Book" panose="02000503020000020003" pitchFamily="2" charset="0"/>
+                <a:ea typeface="Calibri"/>
+                <a:cs typeface="Avenir Light"/>
+                <a:sym typeface="Calibri"/>
+              </a:rPr>
+              <a:t>deed.de</a:t>
+            </a:r>
+            <a:endParaRPr sz="800" dirty="0">
+              <a:solidFill>
+                <a:schemeClr val="tx1">
+                  <a:lumMod val="65000"/>
+                  <a:lumOff val="35000"/>
+                </a:schemeClr>
+              </a:solidFill>
+              <a:latin typeface="Avenir Book" panose="02000503020000020003" pitchFamily="2" charset="0"/>
+              <a:ea typeface="Calibri"/>
+              <a:cs typeface="Avenir Light"/>
+              <a:sym typeface="Calibri"/>
+            </a:endParaRPr>
           </a:p>
         </p:txBody>
       </p:sp>
       <p:pic>
         <p:nvPicPr>
-          <p:cNvPr id="6" name="pasted-image.tif"/>
+          <p:cNvPr id="8" name="pasted-image.tif">
+            <a:extLst>
+              <a:ext uri="{FF2B5EF4-FFF2-40B4-BE49-F238E27FC236}">
+                <a16:creationId xmlns:a16="http://schemas.microsoft.com/office/drawing/2014/main" id="{47D19112-8585-5C03-2010-EB3A0039872B}"/>
+              </a:ext>
+            </a:extLst>
+          </p:cNvPr>
           <p:cNvPicPr/>
           <p:nvPr userDrawn="1"/>
         </p:nvPicPr>
-        <p:blipFill>
-          <a:blip r:embed="rId4">
-            <a:extLst/>
-          </a:blip>
-          <a:stretch>
-            <a:fillRect/>
-          </a:stretch>
+        <p:blipFill rotWithShape="1">
+          <a:blip r:embed="rId4"/>
+          <a:srcRect r="24777" b="-3233"/>
+          <a:stretch/>
         </p:blipFill>
         <p:spPr>
           <a:xfrm>
-            <a:off x="6174185" y="4992838"/>
-            <a:ext cx="886619" cy="214128"/>
+            <a:off x="5724347" y="4733926"/>
+            <a:ext cx="1009828" cy="333374"/>
           </a:xfrm>
           <a:prstGeom prst="rect">
             <a:avLst/>
@@ -766,58 +989,6 @@
           </a:ln>
         </p:spPr>
       </p:pic>
-      <p:sp>
-        <p:nvSpPr>
-          <p:cNvPr id="7" name="Textfeld 6"/>
-          <p:cNvSpPr txBox="1"/>
-          <p:nvPr userDrawn="1"/>
-        </p:nvSpPr>
-        <p:spPr>
-          <a:xfrm>
-            <a:off x="239285" y="4936890"/>
-            <a:ext cx="1044856" cy="276999"/>
-          </a:xfrm>
-          <a:prstGeom prst="rect">
-            <a:avLst/>
-          </a:prstGeom>
-          <a:noFill/>
-        </p:spPr>
-        <p:txBody>
-          <a:bodyPr wrap="square" rtlCol="0">
-            <a:spAutoFit/>
-          </a:bodyPr>
-          <a:lstStyle/>
-          <a:p>
-            <a:r>
-              <a:rPr lang="de-DE" sz="600" dirty="0">
-                <a:solidFill>
-                  <a:srgbClr val="5D5E5F"/>
-                </a:solidFill>
-                <a:latin typeface="Avenir Light"/>
-                <a:cs typeface="Avenir Light"/>
-              </a:rPr>
-              <a:t>Letzte Änderung: </a:t>
-            </a:r>
-            <a:fld id="{7A8C7DAC-E536-564C-B5B3-90E8FAB50562}" type="datetime1">
-              <a:rPr lang="de-DE" sz="600" smtClean="0">
-                <a:solidFill>
-                  <a:srgbClr val="5D5E5F"/>
-                </a:solidFill>
-                <a:latin typeface="Avenir Light"/>
-                <a:cs typeface="Avenir Light"/>
-              </a:rPr>
-              <a:t>01.09.18</a:t>
-            </a:fld>
-            <a:endParaRPr lang="de-DE" sz="600" dirty="0">
-              <a:solidFill>
-                <a:srgbClr val="5D5E5F"/>
-              </a:solidFill>
-              <a:latin typeface="Avenir Light"/>
-              <a:cs typeface="Avenir Light"/>
-            </a:endParaRPr>
-          </a:p>
-        </p:txBody>
-      </p:sp>
     </p:spTree>
     <p:extLst>
       <p:ext uri="{BB962C8B-B14F-4D97-AF65-F5344CB8AC3E}">
@@ -887,7 +1058,7 @@
           <a:p>
             <a:fld id="{FF5B2BAF-DF38-0A48-A798-0C06E514FD52}" type="datetimeFigureOut">
               <a:rPr lang="de-DE" smtClean="0"/>
-              <a:t>01.09.18</a:t>
+              <a:t>23.07.23</a:t>
             </a:fld>
             <a:endParaRPr lang="de-DE" dirty="0"/>
           </a:p>
@@ -1107,7 +1278,7 @@
           <a:p>
             <a:fld id="{FF5B2BAF-DF38-0A48-A798-0C06E514FD52}" type="datetimeFigureOut">
               <a:rPr lang="de-DE" smtClean="0"/>
-              <a:t>01.09.18</a:t>
+              <a:t>23.07.23</a:t>
             </a:fld>
             <a:endParaRPr lang="de-DE" dirty="0"/>
           </a:p>
@@ -1790,7 +1961,7 @@
           <a:p>
             <a:r>
               <a:rPr lang="de-DE" dirty="0"/>
-              <a:t>Kanban eignet sich als Arbeitswerkzeug bei jeder Tätigkeit, die bestimmte aufeinanderfolgende Arbeitsphasen erfordert bis sie abgeschlossen ist.</a:t>
+              <a:t>Kanban eignet sich als Arbeitswerkzeug bei jeder Tätigkeit, die bestimmte aufeinanderfolgende Arbeitsphasen erfordert, bis sie abgeschlossen ist.</a:t>
             </a:r>
           </a:p>
           <a:p>
@@ -1924,31 +2095,6 @@
               <a:buNone/>
             </a:pPr>
             <a:endParaRPr lang="de-DE" dirty="0"/>
-          </a:p>
-        </p:txBody>
-      </p:sp>
-      <p:sp>
-        <p:nvSpPr>
-          <p:cNvPr id="4" name="Untertitel 3"/>
-          <p:cNvSpPr>
-            <a:spLocks noGrp="1"/>
-          </p:cNvSpPr>
-          <p:nvPr>
-            <p:ph type="subTitle" idx="1"/>
-          </p:nvPr>
-        </p:nvSpPr>
-        <p:spPr/>
-        <p:txBody>
-          <a:bodyPr/>
-          <a:lstStyle/>
-          <a:p>
-            <a:pPr marL="0" indent="0">
-              <a:buNone/>
-            </a:pPr>
-            <a:r>
-              <a:rPr lang="de-DE" dirty="0"/>
-              <a:t>Regina Brandhuber</a:t>
-            </a:r>
           </a:p>
         </p:txBody>
       </p:sp>

</xml_diff>

<commit_message>
KAN 04 Blocksatz und Quelle
</commit_message>
<xml_diff>
--- a/training-cards/music moves/Kanban (KAN)/ger_KAN_04_Geschafft_MM_A.pptx
+++ b/training-cards/music moves/Kanban (KAN)/ger_KAN_04_Geschafft_MM_A.pptx
@@ -4,8 +4,11 @@
   <p:sldMasterIdLst>
     <p:sldMasterId id="2147483648" r:id="rId1"/>
   </p:sldMasterIdLst>
+  <p:notesMasterIdLst>
+    <p:notesMasterId r:id="rId4"/>
+  </p:notesMasterIdLst>
   <p:handoutMasterIdLst>
-    <p:handoutMasterId r:id="rId4"/>
+    <p:handoutMasterId r:id="rId5"/>
   </p:handoutMasterIdLst>
   <p:sldIdLst>
     <p:sldId id="258" r:id="rId2"/>
@@ -212,7 +215,7 @@
           <a:p>
             <a:fld id="{10F8DC5B-5F6F-B341-A0E1-3C37FC6B86DA}" type="datetimeFigureOut">
               <a:rPr lang="de-DE" smtClean="0"/>
-              <a:t>23.07.23</a:t>
+              <a:t>02.08.24</a:t>
             </a:fld>
             <a:endParaRPr lang="de-DE"/>
           </a:p>
@@ -293,6 +296,439 @@
   </p:cSld>
   <p:clrMap bg1="lt1" tx1="dk1" bg2="lt2" tx2="dk2" accent1="accent1" accent2="accent2" accent3="accent3" accent4="accent4" accent5="accent5" accent6="accent6" hlink="hlink" folHlink="folHlink"/>
 </p:handoutMaster>
+</file>
+
+<file path=ppt/notesMasters/notesMaster1.xml><?xml version="1.0" encoding="utf-8"?>
+<p:notesMaster xmlns:a="http://schemas.openxmlformats.org/drawingml/2006/main" xmlns:r="http://schemas.openxmlformats.org/officeDocument/2006/relationships" xmlns:p="http://schemas.openxmlformats.org/presentationml/2006/main">
+  <p:cSld>
+    <p:bg>
+      <p:bgRef idx="1001">
+        <a:schemeClr val="bg1"/>
+      </p:bgRef>
+    </p:bg>
+    <p:spTree>
+      <p:nvGrpSpPr>
+        <p:cNvPr id="1" name=""/>
+        <p:cNvGrpSpPr/>
+        <p:nvPr/>
+      </p:nvGrpSpPr>
+      <p:grpSpPr>
+        <a:xfrm>
+          <a:off x="0" y="0"/>
+          <a:ext cx="0" cy="0"/>
+          <a:chOff x="0" y="0"/>
+          <a:chExt cx="0" cy="0"/>
+        </a:xfrm>
+      </p:grpSpPr>
+      <p:sp>
+        <p:nvSpPr>
+          <p:cNvPr id="2" name="Kopfzeilenplatzhalter 1"/>
+          <p:cNvSpPr>
+            <a:spLocks noGrp="1"/>
+          </p:cNvSpPr>
+          <p:nvPr>
+            <p:ph type="hdr" sz="quarter"/>
+          </p:nvPr>
+        </p:nvSpPr>
+        <p:spPr>
+          <a:xfrm>
+            <a:off x="0" y="0"/>
+            <a:ext cx="2971800" cy="458788"/>
+          </a:xfrm>
+          <a:prstGeom prst="rect">
+            <a:avLst/>
+          </a:prstGeom>
+        </p:spPr>
+        <p:txBody>
+          <a:bodyPr vert="horz" lIns="91440" tIns="45720" rIns="91440" bIns="45720" rtlCol="0"/>
+          <a:lstStyle>
+            <a:lvl1pPr algn="l">
+              <a:defRPr sz="1200"/>
+            </a:lvl1pPr>
+          </a:lstStyle>
+          <a:p>
+            <a:endParaRPr lang="de-DE"/>
+          </a:p>
+        </p:txBody>
+      </p:sp>
+      <p:sp>
+        <p:nvSpPr>
+          <p:cNvPr id="3" name="Datumsplatzhalter 2"/>
+          <p:cNvSpPr>
+            <a:spLocks noGrp="1"/>
+          </p:cNvSpPr>
+          <p:nvPr>
+            <p:ph type="dt" idx="1"/>
+          </p:nvPr>
+        </p:nvSpPr>
+        <p:spPr>
+          <a:xfrm>
+            <a:off x="3884613" y="0"/>
+            <a:ext cx="2971800" cy="458788"/>
+          </a:xfrm>
+          <a:prstGeom prst="rect">
+            <a:avLst/>
+          </a:prstGeom>
+        </p:spPr>
+        <p:txBody>
+          <a:bodyPr vert="horz" lIns="91440" tIns="45720" rIns="91440" bIns="45720" rtlCol="0"/>
+          <a:lstStyle>
+            <a:lvl1pPr algn="r">
+              <a:defRPr sz="1200"/>
+            </a:lvl1pPr>
+          </a:lstStyle>
+          <a:p>
+            <a:fld id="{53A20C47-62A1-5F4A-BC26-432EF1E4B382}" type="datetimeFigureOut">
+              <a:rPr lang="de-DE" smtClean="0"/>
+              <a:t>02.08.24</a:t>
+            </a:fld>
+            <a:endParaRPr lang="de-DE"/>
+          </a:p>
+        </p:txBody>
+      </p:sp>
+      <p:sp>
+        <p:nvSpPr>
+          <p:cNvPr id="4" name="Folienbildplatzhalter 3"/>
+          <p:cNvSpPr>
+            <a:spLocks noGrp="1" noRot="1" noChangeAspect="1"/>
+          </p:cNvSpPr>
+          <p:nvPr>
+            <p:ph type="sldImg" idx="2"/>
+          </p:nvPr>
+        </p:nvSpPr>
+        <p:spPr>
+          <a:xfrm>
+            <a:off x="1239838" y="1143000"/>
+            <a:ext cx="4378325" cy="3086100"/>
+          </a:xfrm>
+          <a:prstGeom prst="rect">
+            <a:avLst/>
+          </a:prstGeom>
+          <a:noFill/>
+          <a:ln w="12700">
+            <a:solidFill>
+              <a:prstClr val="black"/>
+            </a:solidFill>
+          </a:ln>
+        </p:spPr>
+        <p:txBody>
+          <a:bodyPr vert="horz" lIns="91440" tIns="45720" rIns="91440" bIns="45720" rtlCol="0" anchor="ctr"/>
+          <a:lstStyle/>
+          <a:p>
+            <a:endParaRPr lang="de-DE"/>
+          </a:p>
+        </p:txBody>
+      </p:sp>
+      <p:sp>
+        <p:nvSpPr>
+          <p:cNvPr id="5" name="Notizenplatzhalter 4"/>
+          <p:cNvSpPr>
+            <a:spLocks noGrp="1"/>
+          </p:cNvSpPr>
+          <p:nvPr>
+            <p:ph type="body" sz="quarter" idx="3"/>
+          </p:nvPr>
+        </p:nvSpPr>
+        <p:spPr>
+          <a:xfrm>
+            <a:off x="685800" y="4400550"/>
+            <a:ext cx="5486400" cy="3600450"/>
+          </a:xfrm>
+          <a:prstGeom prst="rect">
+            <a:avLst/>
+          </a:prstGeom>
+        </p:spPr>
+        <p:txBody>
+          <a:bodyPr vert="horz" lIns="91440" tIns="45720" rIns="91440" bIns="45720" rtlCol="0"/>
+          <a:lstStyle/>
+          <a:p>
+            <a:pPr lvl="0"/>
+            <a:r>
+              <a:rPr lang="de-DE"/>
+              <a:t>Mastertextformat bearbeiten</a:t>
+            </a:r>
+          </a:p>
+          <a:p>
+            <a:pPr lvl="1"/>
+            <a:r>
+              <a:rPr lang="de-DE"/>
+              <a:t>Zweite Ebene</a:t>
+            </a:r>
+          </a:p>
+          <a:p>
+            <a:pPr lvl="2"/>
+            <a:r>
+              <a:rPr lang="de-DE"/>
+              <a:t>Dritte Ebene</a:t>
+            </a:r>
+          </a:p>
+          <a:p>
+            <a:pPr lvl="3"/>
+            <a:r>
+              <a:rPr lang="de-DE"/>
+              <a:t>Vierte Ebene</a:t>
+            </a:r>
+          </a:p>
+          <a:p>
+            <a:pPr lvl="4"/>
+            <a:r>
+              <a:rPr lang="de-DE"/>
+              <a:t>Fünfte Ebene</a:t>
+            </a:r>
+          </a:p>
+        </p:txBody>
+      </p:sp>
+      <p:sp>
+        <p:nvSpPr>
+          <p:cNvPr id="6" name="Fußzeilenplatzhalter 5"/>
+          <p:cNvSpPr>
+            <a:spLocks noGrp="1"/>
+          </p:cNvSpPr>
+          <p:nvPr>
+            <p:ph type="ftr" sz="quarter" idx="4"/>
+          </p:nvPr>
+        </p:nvSpPr>
+        <p:spPr>
+          <a:xfrm>
+            <a:off x="0" y="8685213"/>
+            <a:ext cx="2971800" cy="458787"/>
+          </a:xfrm>
+          <a:prstGeom prst="rect">
+            <a:avLst/>
+          </a:prstGeom>
+        </p:spPr>
+        <p:txBody>
+          <a:bodyPr vert="horz" lIns="91440" tIns="45720" rIns="91440" bIns="45720" rtlCol="0" anchor="b"/>
+          <a:lstStyle>
+            <a:lvl1pPr algn="l">
+              <a:defRPr sz="1200"/>
+            </a:lvl1pPr>
+          </a:lstStyle>
+          <a:p>
+            <a:endParaRPr lang="de-DE"/>
+          </a:p>
+        </p:txBody>
+      </p:sp>
+      <p:sp>
+        <p:nvSpPr>
+          <p:cNvPr id="7" name="Foliennummernplatzhalter 6"/>
+          <p:cNvSpPr>
+            <a:spLocks noGrp="1"/>
+          </p:cNvSpPr>
+          <p:nvPr>
+            <p:ph type="sldNum" sz="quarter" idx="5"/>
+          </p:nvPr>
+        </p:nvSpPr>
+        <p:spPr>
+          <a:xfrm>
+            <a:off x="3884613" y="8685213"/>
+            <a:ext cx="2971800" cy="458787"/>
+          </a:xfrm>
+          <a:prstGeom prst="rect">
+            <a:avLst/>
+          </a:prstGeom>
+        </p:spPr>
+        <p:txBody>
+          <a:bodyPr vert="horz" lIns="91440" tIns="45720" rIns="91440" bIns="45720" rtlCol="0" anchor="b"/>
+          <a:lstStyle>
+            <a:lvl1pPr algn="r">
+              <a:defRPr sz="1200"/>
+            </a:lvl1pPr>
+          </a:lstStyle>
+          <a:p>
+            <a:fld id="{50E88EDF-01B3-A84B-BC57-1FEB7429AFA8}" type="slidenum">
+              <a:rPr lang="de-DE" smtClean="0"/>
+              <a:t>‹Nr.›</a:t>
+            </a:fld>
+            <a:endParaRPr lang="de-DE"/>
+          </a:p>
+        </p:txBody>
+      </p:sp>
+    </p:spTree>
+    <p:extLst>
+      <p:ext uri="{BB962C8B-B14F-4D97-AF65-F5344CB8AC3E}">
+        <p14:creationId xmlns:p14="http://schemas.microsoft.com/office/powerpoint/2010/main" val="3748665534"/>
+      </p:ext>
+    </p:extLst>
+  </p:cSld>
+  <p:clrMap bg1="lt1" tx1="dk1" bg2="lt2" tx2="dk2" accent1="accent1" accent2="accent2" accent3="accent3" accent4="accent4" accent5="accent5" accent6="accent6" hlink="hlink" folHlink="folHlink"/>
+  <p:notesStyle>
+    <a:lvl1pPr marL="0" algn="l" defTabSz="914400" rtl="0" eaLnBrk="1" latinLnBrk="0" hangingPunct="1">
+      <a:defRPr sz="1200" kern="1200">
+        <a:solidFill>
+          <a:schemeClr val="tx1"/>
+        </a:solidFill>
+        <a:latin typeface="+mn-lt"/>
+        <a:ea typeface="+mn-ea"/>
+        <a:cs typeface="+mn-cs"/>
+      </a:defRPr>
+    </a:lvl1pPr>
+    <a:lvl2pPr marL="457200" algn="l" defTabSz="914400" rtl="0" eaLnBrk="1" latinLnBrk="0" hangingPunct="1">
+      <a:defRPr sz="1200" kern="1200">
+        <a:solidFill>
+          <a:schemeClr val="tx1"/>
+        </a:solidFill>
+        <a:latin typeface="+mn-lt"/>
+        <a:ea typeface="+mn-ea"/>
+        <a:cs typeface="+mn-cs"/>
+      </a:defRPr>
+    </a:lvl2pPr>
+    <a:lvl3pPr marL="914400" algn="l" defTabSz="914400" rtl="0" eaLnBrk="1" latinLnBrk="0" hangingPunct="1">
+      <a:defRPr sz="1200" kern="1200">
+        <a:solidFill>
+          <a:schemeClr val="tx1"/>
+        </a:solidFill>
+        <a:latin typeface="+mn-lt"/>
+        <a:ea typeface="+mn-ea"/>
+        <a:cs typeface="+mn-cs"/>
+      </a:defRPr>
+    </a:lvl3pPr>
+    <a:lvl4pPr marL="1371600" algn="l" defTabSz="914400" rtl="0" eaLnBrk="1" latinLnBrk="0" hangingPunct="1">
+      <a:defRPr sz="1200" kern="1200">
+        <a:solidFill>
+          <a:schemeClr val="tx1"/>
+        </a:solidFill>
+        <a:latin typeface="+mn-lt"/>
+        <a:ea typeface="+mn-ea"/>
+        <a:cs typeface="+mn-cs"/>
+      </a:defRPr>
+    </a:lvl4pPr>
+    <a:lvl5pPr marL="1828800" algn="l" defTabSz="914400" rtl="0" eaLnBrk="1" latinLnBrk="0" hangingPunct="1">
+      <a:defRPr sz="1200" kern="1200">
+        <a:solidFill>
+          <a:schemeClr val="tx1"/>
+        </a:solidFill>
+        <a:latin typeface="+mn-lt"/>
+        <a:ea typeface="+mn-ea"/>
+        <a:cs typeface="+mn-cs"/>
+      </a:defRPr>
+    </a:lvl5pPr>
+    <a:lvl6pPr marL="2286000" algn="l" defTabSz="914400" rtl="0" eaLnBrk="1" latinLnBrk="0" hangingPunct="1">
+      <a:defRPr sz="1200" kern="1200">
+        <a:solidFill>
+          <a:schemeClr val="tx1"/>
+        </a:solidFill>
+        <a:latin typeface="+mn-lt"/>
+        <a:ea typeface="+mn-ea"/>
+        <a:cs typeface="+mn-cs"/>
+      </a:defRPr>
+    </a:lvl6pPr>
+    <a:lvl7pPr marL="2743200" algn="l" defTabSz="914400" rtl="0" eaLnBrk="1" latinLnBrk="0" hangingPunct="1">
+      <a:defRPr sz="1200" kern="1200">
+        <a:solidFill>
+          <a:schemeClr val="tx1"/>
+        </a:solidFill>
+        <a:latin typeface="+mn-lt"/>
+        <a:ea typeface="+mn-ea"/>
+        <a:cs typeface="+mn-cs"/>
+      </a:defRPr>
+    </a:lvl7pPr>
+    <a:lvl8pPr marL="3200400" algn="l" defTabSz="914400" rtl="0" eaLnBrk="1" latinLnBrk="0" hangingPunct="1">
+      <a:defRPr sz="1200" kern="1200">
+        <a:solidFill>
+          <a:schemeClr val="tx1"/>
+        </a:solidFill>
+        <a:latin typeface="+mn-lt"/>
+        <a:ea typeface="+mn-ea"/>
+        <a:cs typeface="+mn-cs"/>
+      </a:defRPr>
+    </a:lvl8pPr>
+    <a:lvl9pPr marL="3657600" algn="l" defTabSz="914400" rtl="0" eaLnBrk="1" latinLnBrk="0" hangingPunct="1">
+      <a:defRPr sz="1200" kern="1200">
+        <a:solidFill>
+          <a:schemeClr val="tx1"/>
+        </a:solidFill>
+        <a:latin typeface="+mn-lt"/>
+        <a:ea typeface="+mn-ea"/>
+        <a:cs typeface="+mn-cs"/>
+      </a:defRPr>
+    </a:lvl9pPr>
+  </p:notesStyle>
+</p:notesMaster>
+</file>
+
+<file path=ppt/notesSlides/notesSlide1.xml><?xml version="1.0" encoding="utf-8"?>
+<p:notes xmlns:a="http://schemas.openxmlformats.org/drawingml/2006/main" xmlns:r="http://schemas.openxmlformats.org/officeDocument/2006/relationships" xmlns:p="http://schemas.openxmlformats.org/presentationml/2006/main">
+  <p:cSld>
+    <p:spTree>
+      <p:nvGrpSpPr>
+        <p:cNvPr id="1" name=""/>
+        <p:cNvGrpSpPr/>
+        <p:nvPr/>
+      </p:nvGrpSpPr>
+      <p:grpSpPr>
+        <a:xfrm>
+          <a:off x="0" y="0"/>
+          <a:ext cx="0" cy="0"/>
+          <a:chOff x="0" y="0"/>
+          <a:chExt cx="0" cy="0"/>
+        </a:xfrm>
+      </p:grpSpPr>
+      <p:sp>
+        <p:nvSpPr>
+          <p:cNvPr id="2" name="Folienbildplatzhalter 1"/>
+          <p:cNvSpPr>
+            <a:spLocks noGrp="1" noRot="1" noChangeAspect="1"/>
+          </p:cNvSpPr>
+          <p:nvPr>
+            <p:ph type="sldImg"/>
+          </p:nvPr>
+        </p:nvSpPr>
+        <p:spPr/>
+      </p:sp>
+      <p:sp>
+        <p:nvSpPr>
+          <p:cNvPr id="3" name="Notizenplatzhalter 2"/>
+          <p:cNvSpPr>
+            <a:spLocks noGrp="1"/>
+          </p:cNvSpPr>
+          <p:nvPr>
+            <p:ph type="body" idx="1"/>
+          </p:nvPr>
+        </p:nvSpPr>
+        <p:spPr/>
+        <p:txBody>
+          <a:bodyPr/>
+          <a:lstStyle/>
+          <a:p>
+            <a:endParaRPr lang="de-DE" dirty="0"/>
+          </a:p>
+        </p:txBody>
+      </p:sp>
+      <p:sp>
+        <p:nvSpPr>
+          <p:cNvPr id="4" name="Foliennummernplatzhalter 3"/>
+          <p:cNvSpPr>
+            <a:spLocks noGrp="1"/>
+          </p:cNvSpPr>
+          <p:nvPr>
+            <p:ph type="sldNum" sz="quarter" idx="5"/>
+          </p:nvPr>
+        </p:nvSpPr>
+        <p:spPr/>
+        <p:txBody>
+          <a:bodyPr/>
+          <a:lstStyle/>
+          <a:p>
+            <a:fld id="{50E88EDF-01B3-A84B-BC57-1FEB7429AFA8}" type="slidenum">
+              <a:rPr lang="de-DE" smtClean="0"/>
+              <a:t>1</a:t>
+            </a:fld>
+            <a:endParaRPr lang="de-DE"/>
+          </a:p>
+        </p:txBody>
+      </p:sp>
+    </p:spTree>
+    <p:extLst>
+      <p:ext uri="{BB962C8B-B14F-4D97-AF65-F5344CB8AC3E}">
+        <p14:creationId xmlns:p14="http://schemas.microsoft.com/office/powerpoint/2010/main" val="1809048556"/>
+      </p:ext>
+    </p:extLst>
+  </p:cSld>
+  <p:clrMapOvr>
+    <a:masterClrMapping/>
+  </p:clrMapOvr>
+</p:notes>
 </file>
 
 <file path=ppt/slideLayouts/slideLayout1.xml><?xml version="1.0" encoding="utf-8"?>
@@ -706,7 +1142,7 @@
           </a:ln>
           <a:extLst>
             <a:ext uri="{C572A759-6A51-4108-AA02-DFA0A04FC94B}">
-              <ma14:wrappingTextBoxFlag xmlns="" xmlns:ma14="http://schemas.microsoft.com/office/mac/drawingml/2011/main" val="1"/>
+              <ma14:wrappingTextBoxFlag xmlns:ma14="http://schemas.microsoft.com/office/mac/drawingml/2011/main" xmlns="" val="1"/>
             </a:ext>
           </a:extLst>
         </p:spPr>
@@ -1058,7 +1494,7 @@
           <a:p>
             <a:fld id="{FF5B2BAF-DF38-0A48-A798-0C06E514FD52}" type="datetimeFigureOut">
               <a:rPr lang="de-DE" smtClean="0"/>
-              <a:t>23.07.23</a:t>
+              <a:t>02.08.24</a:t>
             </a:fld>
             <a:endParaRPr lang="de-DE" dirty="0"/>
           </a:p>
@@ -1278,7 +1714,7 @@
           <a:p>
             <a:fld id="{FF5B2BAF-DF38-0A48-A798-0C06E514FD52}" type="datetimeFigureOut">
               <a:rPr lang="de-DE" smtClean="0"/>
-              <a:t>23.07.23</a:t>
+              <a:t>02.08.24</a:t>
             </a:fld>
             <a:endParaRPr lang="de-DE" dirty="0"/>
           </a:p>
@@ -1946,31 +2382,40 @@
             <p:ph idx="13"/>
           </p:nvPr>
         </p:nvSpPr>
-        <p:spPr/>
+        <p:spPr>
+          <a:xfrm>
+            <a:off x="858838" y="1568452"/>
+            <a:ext cx="6235700" cy="3133835"/>
+          </a:xfrm>
+        </p:spPr>
         <p:txBody>
           <a:bodyPr>
             <a:noAutofit/>
           </a:bodyPr>
           <a:lstStyle/>
           <a:p>
-            <a:r>
-              <a:rPr lang="de-DE" dirty="0"/>
-              <a:t>Die so genannte Kanban-Methode stammt aus der Fertigungsindustrie, hat sich aber weiterentwickelt und wird heute auch zur Prozessvisualisierung in der Softwareentwicklung angewandt. </a:t>
-            </a:r>
-          </a:p>
-          <a:p>
+            <a:pPr algn="just"/>
+            <a:r>
+              <a:rPr lang="de-DE" dirty="0"/>
+              <a:t>Die so genannte Kanban-Methode stammt aus der Fertigungsindustrie, hat sich aber weiterentwickelt und wird heute auch zur Prozessvisualisierung in der Softwareentwicklung angewandt (vgl. Anderson 2011, S. 8).</a:t>
+            </a:r>
+          </a:p>
+          <a:p>
+            <a:pPr algn="just"/>
             <a:r>
               <a:rPr lang="de-DE" dirty="0"/>
               <a:t>Kanban eignet sich als Arbeitswerkzeug bei jeder Tätigkeit, die bestimmte aufeinanderfolgende Arbeitsphasen erfordert, bis sie abgeschlossen ist.</a:t>
             </a:r>
           </a:p>
           <a:p>
-            <a:r>
-              <a:rPr lang="de-DE" dirty="0"/>
-              <a:t>Das Wort „Kanban“ kommt aus dem japanischen und bedeutet „Karte“, „Tafel“ oder „Beleg“.</a:t>
-            </a:r>
-          </a:p>
-          <a:p>
+            <a:pPr algn="just"/>
+            <a:r>
+              <a:rPr lang="de-DE" dirty="0"/>
+              <a:t>Das Wort „Kanban“ kommt aus dem japanischen und bedeutet „Signalkarte“ (vgl. ebd., S 15).</a:t>
+            </a:r>
+          </a:p>
+          <a:p>
+            <a:pPr algn="just"/>
             <a:r>
               <a:rPr lang="de-DE" dirty="0"/>
               <a:t>Jede Aufgabe bzw. Phrase wird auf ein Post </a:t>
@@ -2057,7 +2502,7 @@
           <a:p>
             <a:r>
               <a:rPr lang="de-DE" dirty="0"/>
-              <a:t>Bezug zu anderen Trainingskarten: Es ist auch möglich </a:t>
+              <a:t>Bezug zu anderen Trainingskarten: Vielleicht lässt sich</a:t>
             </a:r>
             <a:br>
               <a:rPr lang="de-DE" dirty="0"/>
@@ -2080,21 +2525,43 @@
             </a:r>
             <a:r>
               <a:rPr lang="de-DE" dirty="0"/>
-              <a:t> anhand von Kanban </a:t>
+              <a:t> (SCR 04) mit Kanban </a:t>
             </a:r>
             <a:br>
               <a:rPr lang="de-DE" dirty="0"/>
             </a:br>
             <a:r>
               <a:rPr lang="de-DE" dirty="0"/>
-              <a:t>abzubilden, wenn Du SCR 04 trainiert hast.</a:t>
+              <a:t>kombinieren.</a:t>
             </a:r>
           </a:p>
           <a:p>
             <a:pPr marL="0" indent="0">
               <a:buNone/>
             </a:pPr>
-            <a:endParaRPr lang="de-DE" dirty="0"/>
+            <a:endParaRPr lang="de-DE" sz="800" b="1" dirty="0"/>
+          </a:p>
+          <a:p>
+            <a:pPr marL="0" indent="0">
+              <a:buNone/>
+            </a:pPr>
+            <a:r>
+              <a:rPr lang="de-DE" sz="800" b="1" dirty="0"/>
+              <a:t>Quelle: Anderson</a:t>
+            </a:r>
+            <a:r>
+              <a:rPr lang="de-DE" sz="800"/>
+              <a:t>, David </a:t>
+            </a:r>
+            <a:r>
+              <a:rPr lang="de-DE" sz="800" dirty="0"/>
+              <a:t>J. (2011): Kanban. Evolutionäres Change Management für IT-Organisationen. Heidelberg: </a:t>
+            </a:r>
+            <a:r>
+              <a:rPr lang="de-DE" sz="800" dirty="0" err="1"/>
+              <a:t>dpunkt.verlag</a:t>
+            </a:r>
+            <a:endParaRPr lang="de-DE" sz="800" dirty="0"/>
           </a:p>
         </p:txBody>
       </p:sp>
@@ -2113,7 +2580,7 @@
           <p:nvPr/>
         </p:nvPicPr>
         <p:blipFill rotWithShape="1">
-          <a:blip r:embed="rId2"/>
+          <a:blip r:embed="rId3"/>
           <a:srcRect l="8882" t="15876" r="1515" b="7482"/>
           <a:stretch/>
         </p:blipFill>
@@ -2172,22 +2639,29 @@
             <p:ph idx="1"/>
           </p:nvPr>
         </p:nvSpPr>
-        <p:spPr/>
+        <p:spPr>
+          <a:xfrm>
+            <a:off x="858838" y="1555750"/>
+            <a:ext cx="6222606" cy="3133835"/>
+          </a:xfrm>
+        </p:spPr>
         <p:txBody>
           <a:bodyPr>
             <a:normAutofit/>
           </a:bodyPr>
           <a:lstStyle/>
           <a:p>
+            <a:pPr algn="just"/>
             <a:r>
               <a:rPr lang="de-DE" sz="1200" dirty="0"/>
               <a:t>Lege Dir ein erstes Kanban-Board an.</a:t>
             </a:r>
           </a:p>
           <a:p>
+            <a:pPr algn="just"/>
             <a:r>
               <a:rPr lang="de-DE" sz="1200" dirty="0"/>
-              <a:t>Entweder Du nimmst die Einstiegsvariante mit den drei Spalten "Zu Tun", "In Arbeit" und "Geschafft", oder Du bildest Deinen individuellen Arbeitsprozess oder die Definition </a:t>
+              <a:t>Entweder Du nimmst die Einstiegsvariante mit den drei Spalten auf dem Foto der Vorderseite dieser Karte: "Zu Tun", "In Arbeit" und "Geschafft", oder Du bildest Deinen individuellen Arbeitsprozess oder die Definition </a:t>
             </a:r>
             <a:r>
               <a:rPr lang="de-DE" sz="1200" dirty="0" err="1"/>
@@ -2207,30 +2681,23 @@
             </a:r>
           </a:p>
           <a:p>
+            <a:pPr algn="just"/>
             <a:r>
               <a:rPr lang="de-DE" sz="1200" dirty="0"/>
-              <a:t>Arbeite in 2 Wochen regelmäßig mit Deinem Board und setze mindestens </a:t>
-            </a:r>
-            <a:r>
-              <a:rPr lang="de-DE" sz="1200"/>
-              <a:t>2 Tickets auf </a:t>
-            </a:r>
+              <a:t>Arbeite in 2 Wochen regelmäßig mit Deinem Board und setze mindestens 2 Tickets auf „Geschafft“.</a:t>
+            </a:r>
+          </a:p>
+          <a:p>
             <a:r>
               <a:rPr lang="de-DE" sz="1200" dirty="0"/>
-              <a:t>„Geschafft“.</a:t>
-            </a:r>
-          </a:p>
-          <a:p>
-            <a:r>
-              <a:rPr lang="de-DE" sz="1200" dirty="0"/>
-              <a:t>Zeige Deinem Team Dein Kanban-Board und alles, was Du geschafft </a:t>
+              <a:t>Zeige Deinem Team Dein Kanban-Board und alles, was Du </a:t>
             </a:r>
             <a:br>
               <a:rPr lang="de-DE" sz="1200" dirty="0"/>
             </a:br>
             <a:r>
               <a:rPr lang="de-DE" sz="1200" dirty="0"/>
-              <a:t>hast.</a:t>
+              <a:t>geschafft hast.</a:t>
             </a:r>
           </a:p>
         </p:txBody>
@@ -2569,6 +3036,321 @@
 </file>
 
 <file path=ppt/theme/theme2.xml><?xml version="1.0" encoding="utf-8"?>
+<a:theme xmlns:a="http://schemas.openxmlformats.org/drawingml/2006/main" name="Office">
+  <a:themeElements>
+    <a:clrScheme name="Office">
+      <a:dk1>
+        <a:sysClr val="windowText" lastClr="000000"/>
+      </a:dk1>
+      <a:lt1>
+        <a:sysClr val="window" lastClr="FFFFFF"/>
+      </a:lt1>
+      <a:dk2>
+        <a:srgbClr val="0E2841"/>
+      </a:dk2>
+      <a:lt2>
+        <a:srgbClr val="E8E8E8"/>
+      </a:lt2>
+      <a:accent1>
+        <a:srgbClr val="156082"/>
+      </a:accent1>
+      <a:accent2>
+        <a:srgbClr val="E97132"/>
+      </a:accent2>
+      <a:accent3>
+        <a:srgbClr val="196B24"/>
+      </a:accent3>
+      <a:accent4>
+        <a:srgbClr val="0F9ED5"/>
+      </a:accent4>
+      <a:accent5>
+        <a:srgbClr val="A02B93"/>
+      </a:accent5>
+      <a:accent6>
+        <a:srgbClr val="4EA72E"/>
+      </a:accent6>
+      <a:hlink>
+        <a:srgbClr val="467886"/>
+      </a:hlink>
+      <a:folHlink>
+        <a:srgbClr val="96607D"/>
+      </a:folHlink>
+    </a:clrScheme>
+    <a:fontScheme name="Office">
+      <a:majorFont>
+        <a:latin typeface="Aptos Display" panose="02110004020202020204"/>
+        <a:ea typeface=""/>
+        <a:cs typeface=""/>
+        <a:font script="Jpan" typeface="游ゴシック Light"/>
+        <a:font script="Hang" typeface="맑은 고딕"/>
+        <a:font script="Hans" typeface="等线 Light"/>
+        <a:font script="Hant" typeface="新細明體"/>
+        <a:font script="Arab" typeface="Times New Roman"/>
+        <a:font script="Hebr" typeface="Times New Roman"/>
+        <a:font script="Thai" typeface="Angsana New"/>
+        <a:font script="Ethi" typeface="Nyala"/>
+        <a:font script="Beng" typeface="Vrinda"/>
+        <a:font script="Gujr" typeface="Shruti"/>
+        <a:font script="Khmr" typeface="MoolBoran"/>
+        <a:font script="Knda" typeface="Tunga"/>
+        <a:font script="Guru" typeface="Raavi"/>
+        <a:font script="Cans" typeface="Euphemia"/>
+        <a:font script="Cher" typeface="Plantagenet Cherokee"/>
+        <a:font script="Yiii" typeface="Microsoft Yi Baiti"/>
+        <a:font script="Tibt" typeface="Microsoft Himalaya"/>
+        <a:font script="Thaa" typeface="MV Boli"/>
+        <a:font script="Deva" typeface="Mangal"/>
+        <a:font script="Telu" typeface="Gautami"/>
+        <a:font script="Taml" typeface="Latha"/>
+        <a:font script="Syrc" typeface="Estrangelo Edessa"/>
+        <a:font script="Orya" typeface="Kalinga"/>
+        <a:font script="Mlym" typeface="Kartika"/>
+        <a:font script="Laoo" typeface="DokChampa"/>
+        <a:font script="Sinh" typeface="Iskoola Pota"/>
+        <a:font script="Mong" typeface="Mongolian Baiti"/>
+        <a:font script="Viet" typeface="Times New Roman"/>
+        <a:font script="Uigh" typeface="Microsoft Uighur"/>
+        <a:font script="Geor" typeface="Sylfaen"/>
+        <a:font script="Armn" typeface="Arial"/>
+        <a:font script="Bugi" typeface="Leelawadee UI"/>
+        <a:font script="Bopo" typeface="Microsoft JhengHei"/>
+        <a:font script="Java" typeface="Javanese Text"/>
+        <a:font script="Lisu" typeface="Segoe UI"/>
+        <a:font script="Mymr" typeface="Myanmar Text"/>
+        <a:font script="Nkoo" typeface="Ebrima"/>
+        <a:font script="Olck" typeface="Nirmala UI"/>
+        <a:font script="Osma" typeface="Ebrima"/>
+        <a:font script="Phag" typeface="Phagspa"/>
+        <a:font script="Syrn" typeface="Estrangelo Edessa"/>
+        <a:font script="Syrj" typeface="Estrangelo Edessa"/>
+        <a:font script="Syre" typeface="Estrangelo Edessa"/>
+        <a:font script="Sora" typeface="Nirmala UI"/>
+        <a:font script="Tale" typeface="Microsoft Tai Le"/>
+        <a:font script="Talu" typeface="Microsoft New Tai Lue"/>
+        <a:font script="Tfng" typeface="Ebrima"/>
+      </a:majorFont>
+      <a:minorFont>
+        <a:latin typeface="Aptos" panose="02110004020202020204"/>
+        <a:ea typeface=""/>
+        <a:cs typeface=""/>
+        <a:font script="Jpan" typeface="游ゴシック"/>
+        <a:font script="Hang" typeface="맑은 고딕"/>
+        <a:font script="Hans" typeface="等线"/>
+        <a:font script="Hant" typeface="新細明體"/>
+        <a:font script="Arab" typeface="Arial"/>
+        <a:font script="Hebr" typeface="Arial"/>
+        <a:font script="Thai" typeface="Cordia New"/>
+        <a:font script="Ethi" typeface="Nyala"/>
+        <a:font script="Beng" typeface="Vrinda"/>
+        <a:font script="Gujr" typeface="Shruti"/>
+        <a:font script="Khmr" typeface="DaunPenh"/>
+        <a:font script="Knda" typeface="Tunga"/>
+        <a:font script="Guru" typeface="Raavi"/>
+        <a:font script="Cans" typeface="Euphemia"/>
+        <a:font script="Cher" typeface="Plantagenet Cherokee"/>
+        <a:font script="Yiii" typeface="Microsoft Yi Baiti"/>
+        <a:font script="Tibt" typeface="Microsoft Himalaya"/>
+        <a:font script="Thaa" typeface="MV Boli"/>
+        <a:font script="Deva" typeface="Mangal"/>
+        <a:font script="Telu" typeface="Gautami"/>
+        <a:font script="Taml" typeface="Latha"/>
+        <a:font script="Syrc" typeface="Estrangelo Edessa"/>
+        <a:font script="Orya" typeface="Kalinga"/>
+        <a:font script="Mlym" typeface="Kartika"/>
+        <a:font script="Laoo" typeface="DokChampa"/>
+        <a:font script="Sinh" typeface="Iskoola Pota"/>
+        <a:font script="Mong" typeface="Mongolian Baiti"/>
+        <a:font script="Viet" typeface="Arial"/>
+        <a:font script="Uigh" typeface="Microsoft Uighur"/>
+        <a:font script="Geor" typeface="Sylfaen"/>
+        <a:font script="Armn" typeface="Arial"/>
+        <a:font script="Bugi" typeface="Leelawadee UI"/>
+        <a:font script="Bopo" typeface="Microsoft JhengHei"/>
+        <a:font script="Java" typeface="Javanese Text"/>
+        <a:font script="Lisu" typeface="Segoe UI"/>
+        <a:font script="Mymr" typeface="Myanmar Text"/>
+        <a:font script="Nkoo" typeface="Ebrima"/>
+        <a:font script="Olck" typeface="Nirmala UI"/>
+        <a:font script="Osma" typeface="Ebrima"/>
+        <a:font script="Phag" typeface="Phagspa"/>
+        <a:font script="Syrn" typeface="Estrangelo Edessa"/>
+        <a:font script="Syrj" typeface="Estrangelo Edessa"/>
+        <a:font script="Syre" typeface="Estrangelo Edessa"/>
+        <a:font script="Sora" typeface="Nirmala UI"/>
+        <a:font script="Tale" typeface="Microsoft Tai Le"/>
+        <a:font script="Talu" typeface="Microsoft New Tai Lue"/>
+        <a:font script="Tfng" typeface="Ebrima"/>
+      </a:minorFont>
+    </a:fontScheme>
+    <a:fmtScheme name="Office">
+      <a:fillStyleLst>
+        <a:solidFill>
+          <a:schemeClr val="phClr"/>
+        </a:solidFill>
+        <a:gradFill rotWithShape="1">
+          <a:gsLst>
+            <a:gs pos="0">
+              <a:schemeClr val="phClr">
+                <a:lumMod val="110000"/>
+                <a:satMod val="105000"/>
+                <a:tint val="67000"/>
+              </a:schemeClr>
+            </a:gs>
+            <a:gs pos="50000">
+              <a:schemeClr val="phClr">
+                <a:lumMod val="105000"/>
+                <a:satMod val="103000"/>
+                <a:tint val="73000"/>
+              </a:schemeClr>
+            </a:gs>
+            <a:gs pos="100000">
+              <a:schemeClr val="phClr">
+                <a:lumMod val="105000"/>
+                <a:satMod val="109000"/>
+                <a:tint val="81000"/>
+              </a:schemeClr>
+            </a:gs>
+          </a:gsLst>
+          <a:lin ang="5400000" scaled="0"/>
+        </a:gradFill>
+        <a:gradFill rotWithShape="1">
+          <a:gsLst>
+            <a:gs pos="0">
+              <a:schemeClr val="phClr">
+                <a:satMod val="103000"/>
+                <a:lumMod val="102000"/>
+                <a:tint val="94000"/>
+              </a:schemeClr>
+            </a:gs>
+            <a:gs pos="50000">
+              <a:schemeClr val="phClr">
+                <a:satMod val="110000"/>
+                <a:lumMod val="100000"/>
+                <a:shade val="100000"/>
+              </a:schemeClr>
+            </a:gs>
+            <a:gs pos="100000">
+              <a:schemeClr val="phClr">
+                <a:lumMod val="99000"/>
+                <a:satMod val="120000"/>
+                <a:shade val="78000"/>
+              </a:schemeClr>
+            </a:gs>
+          </a:gsLst>
+          <a:lin ang="5400000" scaled="0"/>
+        </a:gradFill>
+      </a:fillStyleLst>
+      <a:lnStyleLst>
+        <a:ln w="12700" cap="flat" cmpd="sng" algn="ctr">
+          <a:solidFill>
+            <a:schemeClr val="phClr"/>
+          </a:solidFill>
+          <a:prstDash val="solid"/>
+          <a:miter lim="800000"/>
+        </a:ln>
+        <a:ln w="19050" cap="flat" cmpd="sng" algn="ctr">
+          <a:solidFill>
+            <a:schemeClr val="phClr"/>
+          </a:solidFill>
+          <a:prstDash val="solid"/>
+          <a:miter lim="800000"/>
+        </a:ln>
+        <a:ln w="25400" cap="flat" cmpd="sng" algn="ctr">
+          <a:solidFill>
+            <a:schemeClr val="phClr"/>
+          </a:solidFill>
+          <a:prstDash val="solid"/>
+          <a:miter lim="800000"/>
+        </a:ln>
+      </a:lnStyleLst>
+      <a:effectStyleLst>
+        <a:effectStyle>
+          <a:effectLst/>
+        </a:effectStyle>
+        <a:effectStyle>
+          <a:effectLst/>
+        </a:effectStyle>
+        <a:effectStyle>
+          <a:effectLst>
+            <a:outerShdw blurRad="57150" dist="19050" dir="5400000" algn="ctr" rotWithShape="0">
+              <a:srgbClr val="000000">
+                <a:alpha val="63000"/>
+              </a:srgbClr>
+            </a:outerShdw>
+          </a:effectLst>
+        </a:effectStyle>
+      </a:effectStyleLst>
+      <a:bgFillStyleLst>
+        <a:solidFill>
+          <a:schemeClr val="phClr"/>
+        </a:solidFill>
+        <a:solidFill>
+          <a:schemeClr val="phClr">
+            <a:tint val="95000"/>
+            <a:satMod val="170000"/>
+          </a:schemeClr>
+        </a:solidFill>
+        <a:gradFill rotWithShape="1">
+          <a:gsLst>
+            <a:gs pos="0">
+              <a:schemeClr val="phClr">
+                <a:tint val="93000"/>
+                <a:satMod val="150000"/>
+                <a:shade val="98000"/>
+                <a:lumMod val="102000"/>
+              </a:schemeClr>
+            </a:gs>
+            <a:gs pos="50000">
+              <a:schemeClr val="phClr">
+                <a:tint val="98000"/>
+                <a:satMod val="130000"/>
+                <a:shade val="90000"/>
+                <a:lumMod val="103000"/>
+              </a:schemeClr>
+            </a:gs>
+            <a:gs pos="100000">
+              <a:schemeClr val="phClr">
+                <a:shade val="63000"/>
+                <a:satMod val="120000"/>
+              </a:schemeClr>
+            </a:gs>
+          </a:gsLst>
+          <a:lin ang="5400000" scaled="0"/>
+        </a:gradFill>
+      </a:bgFillStyleLst>
+    </a:fmtScheme>
+  </a:themeElements>
+  <a:objectDefaults>
+    <a:lnDef>
+      <a:spPr/>
+      <a:bodyPr/>
+      <a:lstStyle/>
+      <a:style>
+        <a:lnRef idx="2">
+          <a:schemeClr val="accent1"/>
+        </a:lnRef>
+        <a:fillRef idx="0">
+          <a:schemeClr val="accent1"/>
+        </a:fillRef>
+        <a:effectRef idx="1">
+          <a:schemeClr val="accent1"/>
+        </a:effectRef>
+        <a:fontRef idx="minor">
+          <a:schemeClr val="tx1"/>
+        </a:fontRef>
+      </a:style>
+    </a:lnDef>
+  </a:objectDefaults>
+  <a:extraClrSchemeLst/>
+  <a:extLst>
+    <a:ext uri="{05A4C25C-085E-4340-85A3-A5531E510DB2}">
+      <thm15:themeFamily xmlns:thm15="http://schemas.microsoft.com/office/thememl/2012/main" name="Office Theme" id="{2E142A2C-CD16-42D6-873A-C26D2A0506FA}" vid="{1BDDFF52-6CD6-40A5-AB3C-68EB2F1E4D0A}"/>
+    </a:ext>
+  </a:extLst>
+</a:theme>
+</file>
+
+<file path=ppt/theme/theme3.xml><?xml version="1.0" encoding="utf-8"?>
 <a:theme xmlns:a="http://schemas.openxmlformats.org/drawingml/2006/main" name="Office-Design">
   <a:themeElements>
     <a:clrScheme name="Office">

</xml_diff>